<commit_message>
small changes to lecture 4
</commit_message>
<xml_diff>
--- a/classes/prog2015/Prog3-Lecture4.pptx
+++ b/classes/prog2015/Prog3-Lecture4.pptx
@@ -212,7 +212,7 @@
             <a:fld id="{E646CC45-111B-440E-AA41-A3F7A0C1AA6C}" type="datetimeFigureOut">
               <a:rPr lang="en-US" smtClean="0"/>
               <a:pPr/>
-              <a:t>9/8/2015</a:t>
+              <a:t>9/12/2015</a:t>
             </a:fld>
             <a:endParaRPr lang="en-US"/>
           </a:p>
@@ -2218,7 +2218,7 @@
             <a:fld id="{1D8BD707-D9CF-40AE-B4C6-C98DA3205C09}" type="datetimeFigureOut">
               <a:rPr lang="en-US" smtClean="0"/>
               <a:pPr/>
-              <a:t>9/8/2015</a:t>
+              <a:t>9/12/2015</a:t>
             </a:fld>
             <a:endParaRPr lang="en-US"/>
           </a:p>
@@ -2385,7 +2385,7 @@
             <a:fld id="{1D8BD707-D9CF-40AE-B4C6-C98DA3205C09}" type="datetimeFigureOut">
               <a:rPr lang="en-US" smtClean="0"/>
               <a:pPr/>
-              <a:t>9/8/2015</a:t>
+              <a:t>9/12/2015</a:t>
             </a:fld>
             <a:endParaRPr lang="en-US"/>
           </a:p>
@@ -2562,7 +2562,7 @@
             <a:fld id="{1D8BD707-D9CF-40AE-B4C6-C98DA3205C09}" type="datetimeFigureOut">
               <a:rPr lang="en-US" smtClean="0"/>
               <a:pPr/>
-              <a:t>9/8/2015</a:t>
+              <a:t>9/12/2015</a:t>
             </a:fld>
             <a:endParaRPr lang="en-US"/>
           </a:p>
@@ -2729,7 +2729,7 @@
             <a:fld id="{1D8BD707-D9CF-40AE-B4C6-C98DA3205C09}" type="datetimeFigureOut">
               <a:rPr lang="en-US" smtClean="0"/>
               <a:pPr/>
-              <a:t>9/8/2015</a:t>
+              <a:t>9/12/2015</a:t>
             </a:fld>
             <a:endParaRPr lang="en-US"/>
           </a:p>
@@ -2972,7 +2972,7 @@
             <a:fld id="{1D8BD707-D9CF-40AE-B4C6-C98DA3205C09}" type="datetimeFigureOut">
               <a:rPr lang="en-US" smtClean="0"/>
               <a:pPr/>
-              <a:t>9/8/2015</a:t>
+              <a:t>9/12/2015</a:t>
             </a:fld>
             <a:endParaRPr lang="en-US"/>
           </a:p>
@@ -3257,7 +3257,7 @@
             <a:fld id="{1D8BD707-D9CF-40AE-B4C6-C98DA3205C09}" type="datetimeFigureOut">
               <a:rPr lang="en-US" smtClean="0"/>
               <a:pPr/>
-              <a:t>9/8/2015</a:t>
+              <a:t>9/12/2015</a:t>
             </a:fld>
             <a:endParaRPr lang="en-US"/>
           </a:p>
@@ -3676,7 +3676,7 @@
             <a:fld id="{1D8BD707-D9CF-40AE-B4C6-C98DA3205C09}" type="datetimeFigureOut">
               <a:rPr lang="en-US" smtClean="0"/>
               <a:pPr/>
-              <a:t>9/8/2015</a:t>
+              <a:t>9/12/2015</a:t>
             </a:fld>
             <a:endParaRPr lang="en-US"/>
           </a:p>
@@ -3791,7 +3791,7 @@
             <a:fld id="{1D8BD707-D9CF-40AE-B4C6-C98DA3205C09}" type="datetimeFigureOut">
               <a:rPr lang="en-US" smtClean="0"/>
               <a:pPr/>
-              <a:t>9/8/2015</a:t>
+              <a:t>9/12/2015</a:t>
             </a:fld>
             <a:endParaRPr lang="en-US"/>
           </a:p>
@@ -3883,7 +3883,7 @@
             <a:fld id="{1D8BD707-D9CF-40AE-B4C6-C98DA3205C09}" type="datetimeFigureOut">
               <a:rPr lang="en-US" smtClean="0"/>
               <a:pPr/>
-              <a:t>9/8/2015</a:t>
+              <a:t>9/12/2015</a:t>
             </a:fld>
             <a:endParaRPr lang="en-US"/>
           </a:p>
@@ -4157,7 +4157,7 @@
             <a:fld id="{1D8BD707-D9CF-40AE-B4C6-C98DA3205C09}" type="datetimeFigureOut">
               <a:rPr lang="en-US" smtClean="0"/>
               <a:pPr/>
-              <a:t>9/8/2015</a:t>
+              <a:t>9/12/2015</a:t>
             </a:fld>
             <a:endParaRPr lang="en-US"/>
           </a:p>
@@ -4407,7 +4407,7 @@
             <a:fld id="{1D8BD707-D9CF-40AE-B4C6-C98DA3205C09}" type="datetimeFigureOut">
               <a:rPr lang="en-US" smtClean="0"/>
               <a:pPr/>
-              <a:t>9/8/2015</a:t>
+              <a:t>9/12/2015</a:t>
             </a:fld>
             <a:endParaRPr lang="en-US"/>
           </a:p>
@@ -4617,7 +4617,7 @@
             <a:fld id="{1D8BD707-D9CF-40AE-B4C6-C98DA3205C09}" type="datetimeFigureOut">
               <a:rPr lang="en-US" smtClean="0"/>
               <a:pPr/>
-              <a:t>9/8/2015</a:t>
+              <a:t>9/12/2015</a:t>
             </a:fld>
             <a:endParaRPr lang="en-US"/>
           </a:p>
@@ -5013,11 +5013,7 @@
             <a:pPr marL="342900" indent="-342900"/>
             <a:r>
               <a:rPr lang="en-US" dirty="0" smtClean="0"/>
-              <a:t>A </a:t>
-            </a:r>
-            <a:r>
-              <a:rPr lang="en-US" dirty="0" smtClean="0"/>
-              <a:t>Circle class in detail</a:t>
+              <a:t>A Circle class in detail</a:t>
             </a:r>
           </a:p>
         </p:txBody>
@@ -5977,8 +5973,8 @@
         </p:nvSpPr>
         <p:spPr>
           <a:xfrm>
-            <a:off x="1219200" y="228600"/>
-            <a:ext cx="5754781" cy="369332"/>
+            <a:off x="990600" y="228600"/>
+            <a:ext cx="6276847" cy="369332"/>
           </a:xfrm>
           <a:prstGeom prst="rect">
             <a:avLst/>
@@ -5993,7 +5989,11 @@
           <a:p>
             <a:r>
               <a:rPr lang="en-US" dirty="0" smtClean="0"/>
-              <a:t>Our first tip from Effective Java…  Favor immutable objects..</a:t>
+              <a:t>One of many tips from </a:t>
+            </a:r>
+            <a:r>
+              <a:rPr lang="en-US" dirty="0" smtClean="0"/>
+              <a:t>Effective Java…  Favor immutable objects..</a:t>
             </a:r>
             <a:endParaRPr lang="en-US" dirty="0"/>
           </a:p>
@@ -7493,11 +7493,7 @@
           <a:p>
             <a:r>
               <a:rPr lang="en-US" dirty="0" smtClean="0"/>
-              <a:t>our </a:t>
-            </a:r>
-            <a:r>
-              <a:rPr lang="en-US" dirty="0" smtClean="0"/>
-              <a:t>circle is set (to whatever value is passed in as “radius” to the constructor).</a:t>
+              <a:t>our circle is set (to whatever value is passed in as “radius” to the constructor).</a:t>
             </a:r>
           </a:p>
           <a:p>
@@ -8384,11 +8380,7 @@
             </a:r>
             <a:r>
               <a:rPr lang="en-US" smtClean="0"/>
-              <a:t>and </a:t>
-            </a:r>
-            <a:r>
-              <a:rPr lang="en-US" smtClean="0"/>
-              <a:t>interfaces</a:t>
+              <a:t>and interfaces</a:t>
             </a:r>
             <a:endParaRPr lang="en-US" dirty="0" smtClean="0"/>
           </a:p>

</xml_diff>